<commit_message>
update DGE_Tool Rollout 2017.pptx
</commit_message>
<xml_diff>
--- a/DGE_Tools Rollout 2017.pptx
+++ b/DGE_Tools Rollout 2017.pptx
@@ -3903,12 +3903,51 @@
           <a:lstStyle/>
           <a:p>
             <a:r>
+              <a:rPr lang="en-US" sz="2800" dirty="0" err="1" smtClean="0"/>
+              <a:t>Mydesignmatrix</a:t>
+            </a:r>
+            <a:r>
+              <a:rPr lang="en-US" sz="2800" dirty="0" smtClean="0"/>
+              <a:t> = </a:t>
+            </a:r>
+            <a:r>
+              <a:rPr lang="en-US" sz="2800" dirty="0" err="1"/>
+              <a:t>model.matrix</a:t>
+            </a:r>
+            <a:r>
+              <a:rPr lang="en-US" sz="2800" dirty="0"/>
+              <a:t>(</a:t>
+            </a:r>
+            <a:r>
+              <a:rPr lang="en-US" sz="2800" dirty="0" err="1"/>
+              <a:t>myformula</a:t>
+            </a:r>
+            <a:r>
+              <a:rPr lang="en-US" sz="2800" dirty="0"/>
+              <a:t>, </a:t>
+            </a:r>
+            <a:r>
+              <a:rPr lang="en-US" sz="2800" dirty="0" err="1"/>
+              <a:t>mydesign</a:t>
+            </a:r>
+            <a:r>
+              <a:rPr lang="en-US" sz="2800" dirty="0" smtClean="0"/>
+              <a:t>)</a:t>
+            </a:r>
+            <a:endParaRPr lang="en-US" dirty="0" smtClean="0"/>
+          </a:p>
+          <a:p>
+            <a:r>
               <a:rPr lang="en-US" dirty="0" err="1" smtClean="0"/>
               <a:t>MyFit</a:t>
             </a:r>
             <a:r>
               <a:rPr lang="en-US" dirty="0" smtClean="0"/>
-              <a:t> &lt;- Counts %&gt;% </a:t>
+              <a:t> </a:t>
+            </a:r>
+            <a:r>
+              <a:rPr lang="en-US" dirty="0" smtClean="0"/>
+              <a:t>&lt;- Counts %&gt;% </a:t>
             </a:r>
           </a:p>
           <a:p>
@@ -3986,20 +4025,28 @@
             </a:r>
             <a:r>
               <a:rPr lang="en-US" dirty="0" smtClean="0"/>
-              <a:t>)</a:t>
-            </a:r>
-          </a:p>
-          <a:p>
+              <a:t>) %&gt;% </a:t>
+            </a:r>
+          </a:p>
+          <a:p>
+            <a:r>
+              <a:rPr lang="en-US" dirty="0"/>
+              <a:t>	</a:t>
+            </a:r>
+            <a:r>
+              <a:rPr lang="en-US" dirty="0" err="1" smtClean="0"/>
+              <a:t>eBayes</a:t>
+            </a:r>
             <a:endParaRPr lang="en-US" dirty="0"/>
           </a:p>
           <a:p>
             <a:r>
-              <a:rPr lang="en-US" dirty="0" err="1" smtClean="0"/>
-              <a:t>MyContrasts</a:t>
+              <a:rPr lang="en-US" smtClean="0"/>
+              <a:t>MyContrast </a:t>
             </a:r>
             <a:r>
               <a:rPr lang="en-US" dirty="0" smtClean="0"/>
-              <a:t> &lt;- </a:t>
+              <a:t>&lt;- </a:t>
             </a:r>
             <a:r>
               <a:rPr lang="en-US" dirty="0" err="1" smtClean="0"/>
@@ -7322,11 +7369,7 @@
           <a:p>
             <a:r>
               <a:rPr lang="en-US" sz="2400" dirty="0" smtClean="0"/>
-              <a:t>Standardized Data Structure </a:t>
-            </a:r>
-            <a:r>
-              <a:rPr lang="en-US" sz="2400" dirty="0" smtClean="0"/>
-              <a:t>(</a:t>
+              <a:t>Standardized Data Structure (</a:t>
             </a:r>
             <a:r>
               <a:rPr lang="en-US" sz="2400" dirty="0" err="1" smtClean="0"/>
@@ -7336,7 +7379,6 @@
               <a:rPr lang="en-US" sz="2400" dirty="0" smtClean="0"/>
               <a:t>)</a:t>
             </a:r>
-            <a:endParaRPr lang="en-US" sz="2400" dirty="0" smtClean="0"/>
           </a:p>
           <a:p>
             <a:pPr marL="806450" lvl="1" indent="-342900">
@@ -7378,13 +7420,8 @@
             </a:r>
             <a:r>
               <a:rPr lang="en-US" sz="1800" dirty="0" smtClean="0"/>
-              <a:t>osters sharing of code and data among </a:t>
-            </a:r>
-            <a:r>
-              <a:rPr lang="en-US" sz="1800" dirty="0" smtClean="0"/>
-              <a:t>analysts</a:t>
-            </a:r>
-            <a:endParaRPr lang="en-US" sz="1800" dirty="0" smtClean="0"/>
+              <a:t>osters sharing of code and data among analysts</a:t>
+            </a:r>
           </a:p>
           <a:p>
             <a:pPr marL="1138238" lvl="2" indent="-342900">
@@ -14712,24 +14749,6 @@
 </file>
 
 <file path=customXml/item1.xml><?xml version="1.0" encoding="utf-8"?>
-<p:properties xmlns:p="http://schemas.microsoft.com/office/2006/metadata/properties" xmlns:xsi="http://www.w3.org/2001/XMLSchema-instance">
-  <documentManagement>
-    <PublishingExpirationDate xmlns="http://schemas.microsoft.com/sharepoint/v3" xsi:nil="true"/>
-    <PublishingStartDate xmlns="http://schemas.microsoft.com/sharepoint/v3" xsi:nil="true"/>
-  </documentManagement>
-</p:properties>
-</file>
-
-<file path=customXml/item2.xml><?xml version="1.0" encoding="utf-8"?>
-<?mso-contentType ?>
-<FormTemplates xmlns="http://schemas.microsoft.com/sharepoint/v3/contenttype/forms">
-  <Display>DocumentLibraryForm</Display>
-  <Edit>DocumentLibraryForm</Edit>
-  <New>DocumentLibraryForm</New>
-</FormTemplates>
-</file>
-
-<file path=customXml/item3.xml><?xml version="1.0" encoding="utf-8"?>
 <ct:contentTypeSchema xmlns:ct="http://schemas.microsoft.com/office/2006/metadata/contentType" xmlns:ma="http://schemas.microsoft.com/office/2006/metadata/properties/metaAttributes" ct:_="" ma:_="" ma:contentTypeName="Document" ma:contentTypeID="0x010100B7D717AD26BB54428463ED26CB0D7E9E" ma:contentTypeVersion="3" ma:contentTypeDescription="Create a new document." ma:contentTypeScope="" ma:versionID="bf8986cc7c868353b5915001fefac325">
   <xsd:schema xmlns:xsd="http://www.w3.org/2001/XMLSchema" xmlns:p="http://schemas.microsoft.com/office/2006/metadata/properties" xmlns:ns1="http://schemas.microsoft.com/sharepoint/v3" targetNamespace="http://schemas.microsoft.com/office/2006/metadata/properties" ma:root="true" ma:fieldsID="ddb0c952b897a810c8a4e377cff6bff8" ns1:_="">
     <xsd:import namespace="http://schemas.microsoft.com/sharepoint/v3"/>
@@ -14795,30 +14814,25 @@
 </ct:contentTypeSchema>
 </file>
 
-<file path=customXml/itemProps1.xml><?xml version="1.0" encoding="utf-8"?>
-<ds:datastoreItem xmlns:ds="http://schemas.openxmlformats.org/officeDocument/2006/customXml" ds:itemID="{22D02B40-73A0-49EC-984E-6E21484878D7}">
-  <ds:schemaRefs>
-    <ds:schemaRef ds:uri="http://www.w3.org/XML/1998/namespace"/>
-    <ds:schemaRef ds:uri="http://schemas.microsoft.com/sharepoint/v3"/>
-    <ds:schemaRef ds:uri="http://purl.org/dc/elements/1.1/"/>
-    <ds:schemaRef ds:uri="http://schemas.microsoft.com/office/2006/documentManagement/types"/>
-    <ds:schemaRef ds:uri="http://schemas.microsoft.com/office/2006/metadata/properties"/>
-    <ds:schemaRef ds:uri="http://schemas.openxmlformats.org/package/2006/metadata/core-properties"/>
-    <ds:schemaRef ds:uri="http://purl.org/dc/dcmitype/"/>
-    <ds:schemaRef ds:uri="http://purl.org/dc/terms/"/>
-  </ds:schemaRefs>
-</ds:datastoreItem>
+<file path=customXml/item2.xml><?xml version="1.0" encoding="utf-8"?>
+<?mso-contentType ?>
+<FormTemplates xmlns="http://schemas.microsoft.com/sharepoint/v3/contenttype/forms">
+  <Display>DocumentLibraryForm</Display>
+  <Edit>DocumentLibraryForm</Edit>
+  <New>DocumentLibraryForm</New>
+</FormTemplates>
 </file>
 
-<file path=customXml/itemProps2.xml><?xml version="1.0" encoding="utf-8"?>
-<ds:datastoreItem xmlns:ds="http://schemas.openxmlformats.org/officeDocument/2006/customXml" ds:itemID="{7BEEAFA4-C65A-43C8-B565-5092855FE3D8}">
-  <ds:schemaRefs>
-    <ds:schemaRef ds:uri="http://schemas.microsoft.com/sharepoint/v3/contenttype/forms"/>
-  </ds:schemaRefs>
-</ds:datastoreItem>
+<file path=customXml/item3.xml><?xml version="1.0" encoding="utf-8"?>
+<p:properties xmlns:p="http://schemas.microsoft.com/office/2006/metadata/properties" xmlns:xsi="http://www.w3.org/2001/XMLSchema-instance">
+  <documentManagement>
+    <PublishingExpirationDate xmlns="http://schemas.microsoft.com/sharepoint/v3" xsi:nil="true"/>
+    <PublishingStartDate xmlns="http://schemas.microsoft.com/sharepoint/v3" xsi:nil="true"/>
+  </documentManagement>
+</p:properties>
 </file>
 
-<file path=customXml/itemProps3.xml><?xml version="1.0" encoding="utf-8"?>
+<file path=customXml/itemProps1.xml><?xml version="1.0" encoding="utf-8"?>
 <ds:datastoreItem xmlns:ds="http://schemas.openxmlformats.org/officeDocument/2006/customXml" ds:itemID="{419E58A6-6FDB-417D-B366-2AEECAC86031}">
   <ds:schemaRefs>
     <ds:schemaRef ds:uri="http://schemas.microsoft.com/office/2006/metadata/contentType"/>
@@ -14833,4 +14847,27 @@
     <ds:schemaRef ds:uri="http://schemas.microsoft.com/office/internal/2005/internalDocumentation"/>
   </ds:schemaRefs>
 </ds:datastoreItem>
+</file>
+
+<file path=customXml/itemProps2.xml><?xml version="1.0" encoding="utf-8"?>
+<ds:datastoreItem xmlns:ds="http://schemas.openxmlformats.org/officeDocument/2006/customXml" ds:itemID="{7BEEAFA4-C65A-43C8-B565-5092855FE3D8}">
+  <ds:schemaRefs>
+    <ds:schemaRef ds:uri="http://schemas.microsoft.com/sharepoint/v3/contenttype/forms"/>
+  </ds:schemaRefs>
+</ds:datastoreItem>
+</file>
+
+<file path=customXml/itemProps3.xml><?xml version="1.0" encoding="utf-8"?>
+<ds:datastoreItem xmlns:ds="http://schemas.openxmlformats.org/officeDocument/2006/customXml" ds:itemID="{22D02B40-73A0-49EC-984E-6E21484878D7}">
+  <ds:schemaRefs>
+    <ds:schemaRef ds:uri="http://www.w3.org/XML/1998/namespace"/>
+    <ds:schemaRef ds:uri="http://schemas.microsoft.com/sharepoint/v3"/>
+    <ds:schemaRef ds:uri="http://purl.org/dc/elements/1.1/"/>
+    <ds:schemaRef ds:uri="http://schemas.microsoft.com/office/2006/documentManagement/types"/>
+    <ds:schemaRef ds:uri="http://schemas.microsoft.com/office/2006/metadata/properties"/>
+    <ds:schemaRef ds:uri="http://schemas.openxmlformats.org/package/2006/metadata/core-properties"/>
+    <ds:schemaRef ds:uri="http://purl.org/dc/dcmitype/"/>
+    <ds:schemaRef ds:uri="http://purl.org/dc/terms/"/>
+  </ds:schemaRefs>
+</ds:datastoreItem>
 </file>
</xml_diff>